<commit_message>
- add register component - add auth service - add design app.js
Signed-off-by: fxanhkhoa <fxanhkhoa@gmail.com>
</commit_message>
<xml_diff>
--- a/Documents/design/Nodejs-Restful-API/restful-api-design.pptx
+++ b/Documents/design/Nodejs-Restful-API/restful-api-design.pptx
@@ -6,8 +6,9 @@
   </p:sldMasterIdLst>
   <p:sldIdLst>
     <p:sldId id="256" r:id="rId2"/>
-    <p:sldId id="257" r:id="rId3"/>
-    <p:sldId id="258" r:id="rId4"/>
+    <p:sldId id="259" r:id="rId3"/>
+    <p:sldId id="257" r:id="rId4"/>
+    <p:sldId id="258" r:id="rId5"/>
   </p:sldIdLst>
   <p:sldSz cx="12192000" cy="6858000"/>
   <p:notesSz cx="6858000" cy="9144000"/>
@@ -261,7 +262,7 @@
           <a:p>
             <a:fld id="{F0DB0B49-A002-4788-A0E6-031F528145F0}" type="datetimeFigureOut">
               <a:rPr lang="en-US" smtClean="0"/>
-              <a:t>12/19/2019</a:t>
+              <a:t>12/22/2019</a:t>
             </a:fld>
             <a:endParaRPr lang="en-US"/>
           </a:p>
@@ -459,7 +460,7 @@
           <a:p>
             <a:fld id="{F0DB0B49-A002-4788-A0E6-031F528145F0}" type="datetimeFigureOut">
               <a:rPr lang="en-US" smtClean="0"/>
-              <a:t>12/19/2019</a:t>
+              <a:t>12/22/2019</a:t>
             </a:fld>
             <a:endParaRPr lang="en-US"/>
           </a:p>
@@ -667,7 +668,7 @@
           <a:p>
             <a:fld id="{F0DB0B49-A002-4788-A0E6-031F528145F0}" type="datetimeFigureOut">
               <a:rPr lang="en-US" smtClean="0"/>
-              <a:t>12/19/2019</a:t>
+              <a:t>12/22/2019</a:t>
             </a:fld>
             <a:endParaRPr lang="en-US"/>
           </a:p>
@@ -865,7 +866,7 @@
           <a:p>
             <a:fld id="{F0DB0B49-A002-4788-A0E6-031F528145F0}" type="datetimeFigureOut">
               <a:rPr lang="en-US" smtClean="0"/>
-              <a:t>12/19/2019</a:t>
+              <a:t>12/22/2019</a:t>
             </a:fld>
             <a:endParaRPr lang="en-US"/>
           </a:p>
@@ -1140,7 +1141,7 @@
           <a:p>
             <a:fld id="{F0DB0B49-A002-4788-A0E6-031F528145F0}" type="datetimeFigureOut">
               <a:rPr lang="en-US" smtClean="0"/>
-              <a:t>12/19/2019</a:t>
+              <a:t>12/22/2019</a:t>
             </a:fld>
             <a:endParaRPr lang="en-US"/>
           </a:p>
@@ -1405,7 +1406,7 @@
           <a:p>
             <a:fld id="{F0DB0B49-A002-4788-A0E6-031F528145F0}" type="datetimeFigureOut">
               <a:rPr lang="en-US" smtClean="0"/>
-              <a:t>12/19/2019</a:t>
+              <a:t>12/22/2019</a:t>
             </a:fld>
             <a:endParaRPr lang="en-US"/>
           </a:p>
@@ -1817,7 +1818,7 @@
           <a:p>
             <a:fld id="{F0DB0B49-A002-4788-A0E6-031F528145F0}" type="datetimeFigureOut">
               <a:rPr lang="en-US" smtClean="0"/>
-              <a:t>12/19/2019</a:t>
+              <a:t>12/22/2019</a:t>
             </a:fld>
             <a:endParaRPr lang="en-US"/>
           </a:p>
@@ -1958,7 +1959,7 @@
           <a:p>
             <a:fld id="{F0DB0B49-A002-4788-A0E6-031F528145F0}" type="datetimeFigureOut">
               <a:rPr lang="en-US" smtClean="0"/>
-              <a:t>12/19/2019</a:t>
+              <a:t>12/22/2019</a:t>
             </a:fld>
             <a:endParaRPr lang="en-US"/>
           </a:p>
@@ -2071,7 +2072,7 @@
           <a:p>
             <a:fld id="{F0DB0B49-A002-4788-A0E6-031F528145F0}" type="datetimeFigureOut">
               <a:rPr lang="en-US" smtClean="0"/>
-              <a:t>12/19/2019</a:t>
+              <a:t>12/22/2019</a:t>
             </a:fld>
             <a:endParaRPr lang="en-US"/>
           </a:p>
@@ -2382,7 +2383,7 @@
           <a:p>
             <a:fld id="{F0DB0B49-A002-4788-A0E6-031F528145F0}" type="datetimeFigureOut">
               <a:rPr lang="en-US" smtClean="0"/>
-              <a:t>12/19/2019</a:t>
+              <a:t>12/22/2019</a:t>
             </a:fld>
             <a:endParaRPr lang="en-US"/>
           </a:p>
@@ -2670,7 +2671,7 @@
           <a:p>
             <a:fld id="{F0DB0B49-A002-4788-A0E6-031F528145F0}" type="datetimeFigureOut">
               <a:rPr lang="en-US" smtClean="0"/>
-              <a:t>12/19/2019</a:t>
+              <a:t>12/22/2019</a:t>
             </a:fld>
             <a:endParaRPr lang="en-US"/>
           </a:p>
@@ -2911,7 +2912,7 @@
           <a:p>
             <a:fld id="{F0DB0B49-A002-4788-A0E6-031F528145F0}" type="datetimeFigureOut">
               <a:rPr lang="en-US" smtClean="0"/>
-              <a:t>12/19/2019</a:t>
+              <a:t>12/22/2019</a:t>
             </a:fld>
             <a:endParaRPr lang="en-US"/>
           </a:p>
@@ -3806,6 +3807,1201 @@
         <p:spPr>
           <a:xfrm>
             <a:off x="0" y="0"/>
+            <a:ext cx="2589428" cy="923330"/>
+          </a:xfrm>
+          <a:prstGeom prst="rect">
+            <a:avLst/>
+          </a:prstGeom>
+          <a:noFill/>
+        </p:spPr>
+        <p:txBody>
+          <a:bodyPr wrap="none" lIns="91440" tIns="45720" rIns="91440" bIns="45720">
+            <a:spAutoFit/>
+          </a:bodyPr>
+          <a:lstStyle/>
+          <a:p>
+            <a:pPr algn="ctr"/>
+            <a:r>
+              <a:rPr lang="en-US" sz="5400" dirty="0">
+                <a:ln w="0"/>
+                <a:solidFill>
+                  <a:schemeClr val="accent1"/>
+                </a:solidFill>
+                <a:effectLst>
+                  <a:outerShdw blurRad="38100" dist="25400" dir="5400000" algn="ctr" rotWithShape="0">
+                    <a:srgbClr val="6E747A">
+                      <a:alpha val="43000"/>
+                    </a:srgbClr>
+                  </a:outerShdw>
+                </a:effectLst>
+                <a:latin typeface="Times New Roman" panose="02020603050405020304" pitchFamily="18" charset="0"/>
+                <a:cs typeface="Times New Roman" panose="02020603050405020304" pitchFamily="18" charset="0"/>
+              </a:rPr>
+              <a:t>Server.js</a:t>
+            </a:r>
+            <a:endParaRPr lang="en-US" sz="5400" b="0" cap="none" spc="0" dirty="0">
+              <a:ln w="0"/>
+              <a:solidFill>
+                <a:schemeClr val="accent1"/>
+              </a:solidFill>
+              <a:effectLst>
+                <a:outerShdw blurRad="38100" dist="25400" dir="5400000" algn="ctr" rotWithShape="0">
+                  <a:srgbClr val="6E747A">
+                    <a:alpha val="43000"/>
+                  </a:srgbClr>
+                </a:outerShdw>
+              </a:effectLst>
+              <a:latin typeface="Times New Roman" panose="02020603050405020304" pitchFamily="18" charset="0"/>
+              <a:cs typeface="Times New Roman" panose="02020603050405020304" pitchFamily="18" charset="0"/>
+            </a:endParaRPr>
+          </a:p>
+        </p:txBody>
+      </p:sp>
+      <p:sp>
+        <p:nvSpPr>
+          <p:cNvPr id="2" name="Rectangle: Rounded Corners 1">
+            <a:extLst>
+              <a:ext uri="{FF2B5EF4-FFF2-40B4-BE49-F238E27FC236}">
+                <a16:creationId xmlns:a16="http://schemas.microsoft.com/office/drawing/2014/main" id="{0D46D75E-F6EB-468A-AAF7-5098EB1F54B9}"/>
+              </a:ext>
+            </a:extLst>
+          </p:cNvPr>
+          <p:cNvSpPr/>
+          <p:nvPr/>
+        </p:nvSpPr>
+        <p:spPr>
+          <a:xfrm>
+            <a:off x="550664" y="2976239"/>
+            <a:ext cx="976544" cy="452761"/>
+          </a:xfrm>
+          <a:prstGeom prst="roundRect">
+            <a:avLst/>
+          </a:prstGeom>
+          <a:ln>
+            <a:noFill/>
+          </a:ln>
+          <a:effectLst>
+            <a:outerShdw blurRad="44450" dist="27940" dir="5400000" algn="ctr">
+              <a:srgbClr val="000000">
+                <a:alpha val="32000"/>
+              </a:srgbClr>
+            </a:outerShdw>
+          </a:effectLst>
+          <a:scene3d>
+            <a:camera prst="orthographicFront">
+              <a:rot lat="0" lon="0" rev="0"/>
+            </a:camera>
+            <a:lightRig rig="balanced" dir="t">
+              <a:rot lat="0" lon="0" rev="8700000"/>
+            </a:lightRig>
+          </a:scene3d>
+          <a:sp3d>
+            <a:bevelT w="190500" h="38100"/>
+          </a:sp3d>
+        </p:spPr>
+        <p:style>
+          <a:lnRef idx="2">
+            <a:schemeClr val="accent1">
+              <a:shade val="50000"/>
+            </a:schemeClr>
+          </a:lnRef>
+          <a:fillRef idx="1">
+            <a:schemeClr val="accent1"/>
+          </a:fillRef>
+          <a:effectRef idx="0">
+            <a:schemeClr val="accent1"/>
+          </a:effectRef>
+          <a:fontRef idx="minor">
+            <a:schemeClr val="lt1"/>
+          </a:fontRef>
+        </p:style>
+        <p:txBody>
+          <a:bodyPr rtlCol="0" anchor="ctr"/>
+          <a:lstStyle/>
+          <a:p>
+            <a:pPr algn="ctr"/>
+            <a:r>
+              <a:rPr lang="en-US" dirty="0"/>
+              <a:t>App</a:t>
+            </a:r>
+          </a:p>
+        </p:txBody>
+      </p:sp>
+      <p:sp>
+        <p:nvSpPr>
+          <p:cNvPr id="3" name="TextBox 2">
+            <a:extLst>
+              <a:ext uri="{FF2B5EF4-FFF2-40B4-BE49-F238E27FC236}">
+                <a16:creationId xmlns:a16="http://schemas.microsoft.com/office/drawing/2014/main" id="{639E4B47-F622-4EFE-8E46-8E2C7F3780A0}"/>
+              </a:ext>
+            </a:extLst>
+          </p:cNvPr>
+          <p:cNvSpPr txBox="1"/>
+          <p:nvPr/>
+        </p:nvSpPr>
+        <p:spPr>
+          <a:xfrm>
+            <a:off x="294886" y="2317072"/>
+            <a:ext cx="1488100" cy="369332"/>
+          </a:xfrm>
+          <a:prstGeom prst="rect">
+            <a:avLst/>
+          </a:prstGeom>
+          <a:noFill/>
+        </p:spPr>
+        <p:txBody>
+          <a:bodyPr wrap="none" rtlCol="0">
+            <a:spAutoFit/>
+          </a:bodyPr>
+          <a:lstStyle/>
+          <a:p>
+            <a:r>
+              <a:rPr lang="en-US" dirty="0"/>
+              <a:t>App = Express</a:t>
+            </a:r>
+          </a:p>
+        </p:txBody>
+      </p:sp>
+      <p:cxnSp>
+        <p:nvCxnSpPr>
+          <p:cNvPr id="6" name="Straight Arrow Connector 5">
+            <a:extLst>
+              <a:ext uri="{FF2B5EF4-FFF2-40B4-BE49-F238E27FC236}">
+                <a16:creationId xmlns:a16="http://schemas.microsoft.com/office/drawing/2014/main" id="{B96F22AA-51A4-4125-B261-A28CEFBA5C3C}"/>
+              </a:ext>
+            </a:extLst>
+          </p:cNvPr>
+          <p:cNvCxnSpPr>
+            <a:stCxn id="2" idx="0"/>
+            <a:endCxn id="3" idx="2"/>
+          </p:cNvCxnSpPr>
+          <p:nvPr/>
+        </p:nvCxnSpPr>
+        <p:spPr>
+          <a:xfrm flipV="1">
+            <a:off x="1038936" y="2686404"/>
+            <a:ext cx="0" cy="289835"/>
+          </a:xfrm>
+          <a:prstGeom prst="straightConnector1">
+            <a:avLst/>
+          </a:prstGeom>
+          <a:ln>
+            <a:prstDash val="dashDot"/>
+            <a:tailEnd type="triangle"/>
+          </a:ln>
+        </p:spPr>
+        <p:style>
+          <a:lnRef idx="1">
+            <a:schemeClr val="accent1"/>
+          </a:lnRef>
+          <a:fillRef idx="0">
+            <a:schemeClr val="accent1"/>
+          </a:fillRef>
+          <a:effectRef idx="0">
+            <a:schemeClr val="accent1"/>
+          </a:effectRef>
+          <a:fontRef idx="minor">
+            <a:schemeClr val="tx1"/>
+          </a:fontRef>
+        </p:style>
+      </p:cxnSp>
+      <p:sp>
+        <p:nvSpPr>
+          <p:cNvPr id="10" name="Rectangle: Rounded Corners 9">
+            <a:extLst>
+              <a:ext uri="{FF2B5EF4-FFF2-40B4-BE49-F238E27FC236}">
+                <a16:creationId xmlns:a16="http://schemas.microsoft.com/office/drawing/2014/main" id="{82FA6FFA-2F3A-4422-952F-A88C3594D0BC}"/>
+              </a:ext>
+            </a:extLst>
+          </p:cNvPr>
+          <p:cNvSpPr/>
+          <p:nvPr/>
+        </p:nvSpPr>
+        <p:spPr>
+          <a:xfrm>
+            <a:off x="4092854" y="763479"/>
+            <a:ext cx="976544" cy="452761"/>
+          </a:xfrm>
+          <a:prstGeom prst="roundRect">
+            <a:avLst/>
+          </a:prstGeom>
+          <a:solidFill>
+            <a:schemeClr val="accent6">
+              <a:lumMod val="75000"/>
+            </a:schemeClr>
+          </a:solidFill>
+          <a:ln>
+            <a:noFill/>
+          </a:ln>
+          <a:effectLst>
+            <a:outerShdw blurRad="44450" dist="27940" dir="5400000" algn="ctr">
+              <a:srgbClr val="000000">
+                <a:alpha val="32000"/>
+              </a:srgbClr>
+            </a:outerShdw>
+          </a:effectLst>
+          <a:scene3d>
+            <a:camera prst="orthographicFront">
+              <a:rot lat="0" lon="0" rev="0"/>
+            </a:camera>
+            <a:lightRig rig="balanced" dir="t">
+              <a:rot lat="0" lon="0" rev="8700000"/>
+            </a:lightRig>
+          </a:scene3d>
+          <a:sp3d>
+            <a:bevelT w="190500" h="38100"/>
+          </a:sp3d>
+        </p:spPr>
+        <p:style>
+          <a:lnRef idx="2">
+            <a:schemeClr val="accent1">
+              <a:shade val="50000"/>
+            </a:schemeClr>
+          </a:lnRef>
+          <a:fillRef idx="1">
+            <a:schemeClr val="accent1"/>
+          </a:fillRef>
+          <a:effectRef idx="0">
+            <a:schemeClr val="accent1"/>
+          </a:effectRef>
+          <a:fontRef idx="minor">
+            <a:schemeClr val="lt1"/>
+          </a:fontRef>
+        </p:style>
+        <p:txBody>
+          <a:bodyPr rtlCol="0" anchor="ctr"/>
+          <a:lstStyle/>
+          <a:p>
+            <a:pPr algn="ctr"/>
+            <a:r>
+              <a:rPr lang="en-US" dirty="0" err="1"/>
+              <a:t>Cors</a:t>
+            </a:r>
+            <a:endParaRPr lang="en-US" dirty="0"/>
+          </a:p>
+        </p:txBody>
+      </p:sp>
+      <p:sp>
+        <p:nvSpPr>
+          <p:cNvPr id="11" name="Rectangle: Rounded Corners 10">
+            <a:extLst>
+              <a:ext uri="{FF2B5EF4-FFF2-40B4-BE49-F238E27FC236}">
+                <a16:creationId xmlns:a16="http://schemas.microsoft.com/office/drawing/2014/main" id="{602C0B3D-A211-41E1-8993-035856C3B8BE}"/>
+              </a:ext>
+            </a:extLst>
+          </p:cNvPr>
+          <p:cNvSpPr/>
+          <p:nvPr/>
+        </p:nvSpPr>
+        <p:spPr>
+          <a:xfrm>
+            <a:off x="4092854" y="1420427"/>
+            <a:ext cx="1722019" cy="452761"/>
+          </a:xfrm>
+          <a:prstGeom prst="roundRect">
+            <a:avLst/>
+          </a:prstGeom>
+          <a:solidFill>
+            <a:schemeClr val="accent6">
+              <a:lumMod val="75000"/>
+            </a:schemeClr>
+          </a:solidFill>
+          <a:ln>
+            <a:noFill/>
+          </a:ln>
+          <a:effectLst>
+            <a:outerShdw blurRad="44450" dist="27940" dir="5400000" algn="ctr">
+              <a:srgbClr val="000000">
+                <a:alpha val="32000"/>
+              </a:srgbClr>
+            </a:outerShdw>
+          </a:effectLst>
+          <a:scene3d>
+            <a:camera prst="orthographicFront">
+              <a:rot lat="0" lon="0" rev="0"/>
+            </a:camera>
+            <a:lightRig rig="balanced" dir="t">
+              <a:rot lat="0" lon="0" rev="8700000"/>
+            </a:lightRig>
+          </a:scene3d>
+          <a:sp3d>
+            <a:bevelT w="190500" h="38100"/>
+          </a:sp3d>
+        </p:spPr>
+        <p:style>
+          <a:lnRef idx="2">
+            <a:schemeClr val="accent1">
+              <a:shade val="50000"/>
+            </a:schemeClr>
+          </a:lnRef>
+          <a:fillRef idx="1">
+            <a:schemeClr val="accent1"/>
+          </a:fillRef>
+          <a:effectRef idx="0">
+            <a:schemeClr val="accent1"/>
+          </a:effectRef>
+          <a:fontRef idx="minor">
+            <a:schemeClr val="lt1"/>
+          </a:fontRef>
+        </p:style>
+        <p:txBody>
+          <a:bodyPr rtlCol="0" anchor="ctr"/>
+          <a:lstStyle/>
+          <a:p>
+            <a:pPr algn="ctr"/>
+            <a:r>
+              <a:rPr lang="en-US" dirty="0" err="1"/>
+              <a:t>bodyParser.json</a:t>
+            </a:r>
+            <a:endParaRPr lang="en-US" dirty="0"/>
+          </a:p>
+        </p:txBody>
+      </p:sp>
+      <p:sp>
+        <p:nvSpPr>
+          <p:cNvPr id="12" name="Rectangle: Rounded Corners 11">
+            <a:extLst>
+              <a:ext uri="{FF2B5EF4-FFF2-40B4-BE49-F238E27FC236}">
+                <a16:creationId xmlns:a16="http://schemas.microsoft.com/office/drawing/2014/main" id="{6ED5A11F-B9A2-4675-B226-7A18B94CC2E5}"/>
+              </a:ext>
+            </a:extLst>
+          </p:cNvPr>
+          <p:cNvSpPr/>
+          <p:nvPr/>
+        </p:nvSpPr>
+        <p:spPr>
+          <a:xfrm>
+            <a:off x="4092854" y="2077375"/>
+            <a:ext cx="2003146" cy="452761"/>
+          </a:xfrm>
+          <a:prstGeom prst="roundRect">
+            <a:avLst/>
+          </a:prstGeom>
+          <a:solidFill>
+            <a:schemeClr val="accent6">
+              <a:lumMod val="75000"/>
+            </a:schemeClr>
+          </a:solidFill>
+          <a:ln>
+            <a:noFill/>
+          </a:ln>
+          <a:effectLst>
+            <a:outerShdw blurRad="44450" dist="27940" dir="5400000" algn="ctr">
+              <a:srgbClr val="000000">
+                <a:alpha val="32000"/>
+              </a:srgbClr>
+            </a:outerShdw>
+          </a:effectLst>
+          <a:scene3d>
+            <a:camera prst="orthographicFront">
+              <a:rot lat="0" lon="0" rev="0"/>
+            </a:camera>
+            <a:lightRig rig="balanced" dir="t">
+              <a:rot lat="0" lon="0" rev="8700000"/>
+            </a:lightRig>
+          </a:scene3d>
+          <a:sp3d>
+            <a:bevelT w="190500" h="38100"/>
+          </a:sp3d>
+        </p:spPr>
+        <p:style>
+          <a:lnRef idx="2">
+            <a:schemeClr val="accent1">
+              <a:shade val="50000"/>
+            </a:schemeClr>
+          </a:lnRef>
+          <a:fillRef idx="1">
+            <a:schemeClr val="accent1"/>
+          </a:fillRef>
+          <a:effectRef idx="0">
+            <a:schemeClr val="accent1"/>
+          </a:effectRef>
+          <a:fontRef idx="minor">
+            <a:schemeClr val="lt1"/>
+          </a:fontRef>
+        </p:style>
+        <p:txBody>
+          <a:bodyPr rtlCol="0" anchor="ctr"/>
+          <a:lstStyle/>
+          <a:p>
+            <a:pPr algn="ctr"/>
+            <a:r>
+              <a:rPr lang="en-US" dirty="0"/>
+              <a:t>/</a:t>
+            </a:r>
+            <a:r>
+              <a:rPr lang="en-US" dirty="0" err="1"/>
+              <a:t>api</a:t>
+            </a:r>
+            <a:r>
+              <a:rPr lang="en-US" dirty="0"/>
+              <a:t> as routes/</a:t>
+            </a:r>
+            <a:r>
+              <a:rPr lang="en-US" dirty="0" err="1"/>
+              <a:t>api</a:t>
+            </a:r>
+            <a:endParaRPr lang="en-US" dirty="0"/>
+          </a:p>
+        </p:txBody>
+      </p:sp>
+      <p:sp>
+        <p:nvSpPr>
+          <p:cNvPr id="13" name="Oval 12">
+            <a:extLst>
+              <a:ext uri="{FF2B5EF4-FFF2-40B4-BE49-F238E27FC236}">
+                <a16:creationId xmlns:a16="http://schemas.microsoft.com/office/drawing/2014/main" id="{C33CC73C-6C99-4690-B484-A5DE9614B4AD}"/>
+              </a:ext>
+            </a:extLst>
+          </p:cNvPr>
+          <p:cNvSpPr/>
+          <p:nvPr/>
+        </p:nvSpPr>
+        <p:spPr>
+          <a:xfrm>
+            <a:off x="2290439" y="1873188"/>
+            <a:ext cx="941033" cy="452761"/>
+          </a:xfrm>
+          <a:prstGeom prst="ellipse">
+            <a:avLst/>
+          </a:prstGeom>
+          <a:solidFill>
+            <a:schemeClr val="tx2">
+              <a:lumMod val="50000"/>
+            </a:schemeClr>
+          </a:solidFill>
+          <a:ln>
+            <a:noFill/>
+          </a:ln>
+          <a:effectLst>
+            <a:outerShdw blurRad="44450" dist="27940" dir="5400000" algn="ctr">
+              <a:srgbClr val="000000">
+                <a:alpha val="32000"/>
+              </a:srgbClr>
+            </a:outerShdw>
+          </a:effectLst>
+          <a:scene3d>
+            <a:camera prst="orthographicFront">
+              <a:rot lat="0" lon="0" rev="0"/>
+            </a:camera>
+            <a:lightRig rig="balanced" dir="t">
+              <a:rot lat="0" lon="0" rev="8700000"/>
+            </a:lightRig>
+          </a:scene3d>
+          <a:sp3d>
+            <a:bevelT w="190500" h="38100"/>
+          </a:sp3d>
+        </p:spPr>
+        <p:style>
+          <a:lnRef idx="2">
+            <a:schemeClr val="accent1">
+              <a:shade val="50000"/>
+            </a:schemeClr>
+          </a:lnRef>
+          <a:fillRef idx="1">
+            <a:schemeClr val="accent1"/>
+          </a:fillRef>
+          <a:effectRef idx="0">
+            <a:schemeClr val="accent1"/>
+          </a:effectRef>
+          <a:fontRef idx="minor">
+            <a:schemeClr val="lt1"/>
+          </a:fontRef>
+        </p:style>
+        <p:txBody>
+          <a:bodyPr rtlCol="0" anchor="ctr"/>
+          <a:lstStyle/>
+          <a:p>
+            <a:pPr algn="ctr"/>
+            <a:r>
+              <a:rPr lang="en-US" dirty="0"/>
+              <a:t>Use</a:t>
+            </a:r>
+          </a:p>
+        </p:txBody>
+      </p:sp>
+      <p:cxnSp>
+        <p:nvCxnSpPr>
+          <p:cNvPr id="15" name="Straight Arrow Connector 14">
+            <a:extLst>
+              <a:ext uri="{FF2B5EF4-FFF2-40B4-BE49-F238E27FC236}">
+                <a16:creationId xmlns:a16="http://schemas.microsoft.com/office/drawing/2014/main" id="{458582E3-9467-406E-89E3-A06CF42643BC}"/>
+              </a:ext>
+            </a:extLst>
+          </p:cNvPr>
+          <p:cNvCxnSpPr>
+            <a:stCxn id="2" idx="3"/>
+            <a:endCxn id="13" idx="2"/>
+          </p:cNvCxnSpPr>
+          <p:nvPr/>
+        </p:nvCxnSpPr>
+        <p:spPr>
+          <a:xfrm flipV="1">
+            <a:off x="1527208" y="2099569"/>
+            <a:ext cx="763231" cy="1103051"/>
+          </a:xfrm>
+          <a:prstGeom prst="straightConnector1">
+            <a:avLst/>
+          </a:prstGeom>
+          <a:ln>
+            <a:tailEnd type="triangle"/>
+          </a:ln>
+        </p:spPr>
+        <p:style>
+          <a:lnRef idx="1">
+            <a:schemeClr val="accent1"/>
+          </a:lnRef>
+          <a:fillRef idx="0">
+            <a:schemeClr val="accent1"/>
+          </a:fillRef>
+          <a:effectRef idx="0">
+            <a:schemeClr val="accent1"/>
+          </a:effectRef>
+          <a:fontRef idx="minor">
+            <a:schemeClr val="tx1"/>
+          </a:fontRef>
+        </p:style>
+      </p:cxnSp>
+      <p:cxnSp>
+        <p:nvCxnSpPr>
+          <p:cNvPr id="17" name="Straight Arrow Connector 16">
+            <a:extLst>
+              <a:ext uri="{FF2B5EF4-FFF2-40B4-BE49-F238E27FC236}">
+                <a16:creationId xmlns:a16="http://schemas.microsoft.com/office/drawing/2014/main" id="{9D16158D-607F-4E87-81D2-F07CFE455FF6}"/>
+              </a:ext>
+            </a:extLst>
+          </p:cNvPr>
+          <p:cNvCxnSpPr>
+            <a:stCxn id="13" idx="6"/>
+            <a:endCxn id="10" idx="1"/>
+          </p:cNvCxnSpPr>
+          <p:nvPr/>
+        </p:nvCxnSpPr>
+        <p:spPr>
+          <a:xfrm flipV="1">
+            <a:off x="3231472" y="989860"/>
+            <a:ext cx="861382" cy="1109709"/>
+          </a:xfrm>
+          <a:prstGeom prst="straightConnector1">
+            <a:avLst/>
+          </a:prstGeom>
+          <a:ln>
+            <a:tailEnd type="triangle"/>
+          </a:ln>
+        </p:spPr>
+        <p:style>
+          <a:lnRef idx="1">
+            <a:schemeClr val="accent1"/>
+          </a:lnRef>
+          <a:fillRef idx="0">
+            <a:schemeClr val="accent1"/>
+          </a:fillRef>
+          <a:effectRef idx="0">
+            <a:schemeClr val="accent1"/>
+          </a:effectRef>
+          <a:fontRef idx="minor">
+            <a:schemeClr val="tx1"/>
+          </a:fontRef>
+        </p:style>
+      </p:cxnSp>
+      <p:cxnSp>
+        <p:nvCxnSpPr>
+          <p:cNvPr id="19" name="Straight Arrow Connector 18">
+            <a:extLst>
+              <a:ext uri="{FF2B5EF4-FFF2-40B4-BE49-F238E27FC236}">
+                <a16:creationId xmlns:a16="http://schemas.microsoft.com/office/drawing/2014/main" id="{8BEAA517-E485-41D9-B22D-0041A62EEC48}"/>
+              </a:ext>
+            </a:extLst>
+          </p:cNvPr>
+          <p:cNvCxnSpPr>
+            <a:stCxn id="13" idx="6"/>
+            <a:endCxn id="11" idx="1"/>
+          </p:cNvCxnSpPr>
+          <p:nvPr/>
+        </p:nvCxnSpPr>
+        <p:spPr>
+          <a:xfrm flipV="1">
+            <a:off x="3231472" y="1646808"/>
+            <a:ext cx="861382" cy="452761"/>
+          </a:xfrm>
+          <a:prstGeom prst="straightConnector1">
+            <a:avLst/>
+          </a:prstGeom>
+          <a:ln>
+            <a:tailEnd type="triangle"/>
+          </a:ln>
+        </p:spPr>
+        <p:style>
+          <a:lnRef idx="1">
+            <a:schemeClr val="accent1"/>
+          </a:lnRef>
+          <a:fillRef idx="0">
+            <a:schemeClr val="accent1"/>
+          </a:fillRef>
+          <a:effectRef idx="0">
+            <a:schemeClr val="accent1"/>
+          </a:effectRef>
+          <a:fontRef idx="minor">
+            <a:schemeClr val="tx1"/>
+          </a:fontRef>
+        </p:style>
+      </p:cxnSp>
+      <p:cxnSp>
+        <p:nvCxnSpPr>
+          <p:cNvPr id="21" name="Straight Arrow Connector 20">
+            <a:extLst>
+              <a:ext uri="{FF2B5EF4-FFF2-40B4-BE49-F238E27FC236}">
+                <a16:creationId xmlns:a16="http://schemas.microsoft.com/office/drawing/2014/main" id="{C700D02F-0F3A-49E9-BA8C-AE58BE5A64B4}"/>
+              </a:ext>
+            </a:extLst>
+          </p:cNvPr>
+          <p:cNvCxnSpPr>
+            <a:cxnSpLocks/>
+            <a:stCxn id="13" idx="6"/>
+            <a:endCxn id="12" idx="1"/>
+          </p:cNvCxnSpPr>
+          <p:nvPr/>
+        </p:nvCxnSpPr>
+        <p:spPr>
+          <a:xfrm>
+            <a:off x="3231472" y="2099569"/>
+            <a:ext cx="861382" cy="204187"/>
+          </a:xfrm>
+          <a:prstGeom prst="straightConnector1">
+            <a:avLst/>
+          </a:prstGeom>
+          <a:ln>
+            <a:tailEnd type="triangle"/>
+          </a:ln>
+        </p:spPr>
+        <p:style>
+          <a:lnRef idx="1">
+            <a:schemeClr val="accent1"/>
+          </a:lnRef>
+          <a:fillRef idx="0">
+            <a:schemeClr val="accent1"/>
+          </a:fillRef>
+          <a:effectRef idx="0">
+            <a:schemeClr val="accent1"/>
+          </a:effectRef>
+          <a:fontRef idx="minor">
+            <a:schemeClr val="tx1"/>
+          </a:fontRef>
+        </p:style>
+      </p:cxnSp>
+      <p:sp>
+        <p:nvSpPr>
+          <p:cNvPr id="23" name="Rectangle: Rounded Corners 22">
+            <a:extLst>
+              <a:ext uri="{FF2B5EF4-FFF2-40B4-BE49-F238E27FC236}">
+                <a16:creationId xmlns:a16="http://schemas.microsoft.com/office/drawing/2014/main" id="{51901A9E-6EBD-45D1-9A3F-0F2F76D53366}"/>
+              </a:ext>
+            </a:extLst>
+          </p:cNvPr>
+          <p:cNvSpPr/>
+          <p:nvPr/>
+        </p:nvSpPr>
+        <p:spPr>
+          <a:xfrm>
+            <a:off x="4092854" y="3080552"/>
+            <a:ext cx="1722019" cy="452761"/>
+          </a:xfrm>
+          <a:prstGeom prst="roundRect">
+            <a:avLst/>
+          </a:prstGeom>
+          <a:solidFill>
+            <a:schemeClr val="accent6">
+              <a:lumMod val="75000"/>
+            </a:schemeClr>
+          </a:solidFill>
+          <a:ln>
+            <a:noFill/>
+          </a:ln>
+          <a:effectLst>
+            <a:outerShdw blurRad="44450" dist="27940" dir="5400000" algn="ctr">
+              <a:srgbClr val="000000">
+                <a:alpha val="32000"/>
+              </a:srgbClr>
+            </a:outerShdw>
+          </a:effectLst>
+          <a:scene3d>
+            <a:camera prst="orthographicFront">
+              <a:rot lat="0" lon="0" rev="0"/>
+            </a:camera>
+            <a:lightRig rig="balanced" dir="t">
+              <a:rot lat="0" lon="0" rev="8700000"/>
+            </a:lightRig>
+          </a:scene3d>
+          <a:sp3d>
+            <a:bevelT w="190500" h="38100"/>
+          </a:sp3d>
+        </p:spPr>
+        <p:style>
+          <a:lnRef idx="2">
+            <a:schemeClr val="accent1">
+              <a:shade val="50000"/>
+            </a:schemeClr>
+          </a:lnRef>
+          <a:fillRef idx="1">
+            <a:schemeClr val="accent1"/>
+          </a:fillRef>
+          <a:effectRef idx="0">
+            <a:schemeClr val="accent1"/>
+          </a:effectRef>
+          <a:fontRef idx="minor">
+            <a:schemeClr val="lt1"/>
+          </a:fontRef>
+        </p:style>
+        <p:txBody>
+          <a:bodyPr rtlCol="0" anchor="ctr"/>
+          <a:lstStyle/>
+          <a:p>
+            <a:pPr algn="ctr"/>
+            <a:r>
+              <a:rPr lang="en-US" dirty="0"/>
+              <a:t>/ for root page</a:t>
+            </a:r>
+          </a:p>
+        </p:txBody>
+      </p:sp>
+      <p:sp>
+        <p:nvSpPr>
+          <p:cNvPr id="28" name="Oval 27">
+            <a:extLst>
+              <a:ext uri="{FF2B5EF4-FFF2-40B4-BE49-F238E27FC236}">
+                <a16:creationId xmlns:a16="http://schemas.microsoft.com/office/drawing/2014/main" id="{A845BA63-8D86-4B59-B968-50C5ACE8D017}"/>
+              </a:ext>
+            </a:extLst>
+          </p:cNvPr>
+          <p:cNvSpPr/>
+          <p:nvPr/>
+        </p:nvSpPr>
+        <p:spPr>
+          <a:xfrm>
+            <a:off x="2289013" y="3049427"/>
+            <a:ext cx="941033" cy="452761"/>
+          </a:xfrm>
+          <a:prstGeom prst="ellipse">
+            <a:avLst/>
+          </a:prstGeom>
+          <a:solidFill>
+            <a:schemeClr val="tx2">
+              <a:lumMod val="50000"/>
+            </a:schemeClr>
+          </a:solidFill>
+          <a:ln>
+            <a:noFill/>
+          </a:ln>
+          <a:effectLst>
+            <a:outerShdw blurRad="44450" dist="27940" dir="5400000" algn="ctr">
+              <a:srgbClr val="000000">
+                <a:alpha val="32000"/>
+              </a:srgbClr>
+            </a:outerShdw>
+          </a:effectLst>
+          <a:scene3d>
+            <a:camera prst="orthographicFront">
+              <a:rot lat="0" lon="0" rev="0"/>
+            </a:camera>
+            <a:lightRig rig="balanced" dir="t">
+              <a:rot lat="0" lon="0" rev="8700000"/>
+            </a:lightRig>
+          </a:scene3d>
+          <a:sp3d>
+            <a:bevelT w="190500" h="38100"/>
+          </a:sp3d>
+        </p:spPr>
+        <p:style>
+          <a:lnRef idx="2">
+            <a:schemeClr val="accent1">
+              <a:shade val="50000"/>
+            </a:schemeClr>
+          </a:lnRef>
+          <a:fillRef idx="1">
+            <a:schemeClr val="accent1"/>
+          </a:fillRef>
+          <a:effectRef idx="0">
+            <a:schemeClr val="accent1"/>
+          </a:effectRef>
+          <a:fontRef idx="minor">
+            <a:schemeClr val="lt1"/>
+          </a:fontRef>
+        </p:style>
+        <p:txBody>
+          <a:bodyPr rtlCol="0" anchor="ctr"/>
+          <a:lstStyle/>
+          <a:p>
+            <a:pPr algn="ctr"/>
+            <a:r>
+              <a:rPr lang="en-US" dirty="0"/>
+              <a:t>Get</a:t>
+            </a:r>
+          </a:p>
+        </p:txBody>
+      </p:sp>
+      <p:cxnSp>
+        <p:nvCxnSpPr>
+          <p:cNvPr id="30" name="Straight Arrow Connector 29">
+            <a:extLst>
+              <a:ext uri="{FF2B5EF4-FFF2-40B4-BE49-F238E27FC236}">
+                <a16:creationId xmlns:a16="http://schemas.microsoft.com/office/drawing/2014/main" id="{9E39D6D3-C67D-4A86-94A9-AC0ECBF551F9}"/>
+              </a:ext>
+            </a:extLst>
+          </p:cNvPr>
+          <p:cNvCxnSpPr>
+            <a:stCxn id="2" idx="3"/>
+            <a:endCxn id="28" idx="2"/>
+          </p:cNvCxnSpPr>
+          <p:nvPr/>
+        </p:nvCxnSpPr>
+        <p:spPr>
+          <a:xfrm>
+            <a:off x="1527208" y="3202620"/>
+            <a:ext cx="761805" cy="73188"/>
+          </a:xfrm>
+          <a:prstGeom prst="straightConnector1">
+            <a:avLst/>
+          </a:prstGeom>
+          <a:ln>
+            <a:tailEnd type="triangle"/>
+          </a:ln>
+        </p:spPr>
+        <p:style>
+          <a:lnRef idx="1">
+            <a:schemeClr val="accent1"/>
+          </a:lnRef>
+          <a:fillRef idx="0">
+            <a:schemeClr val="accent1"/>
+          </a:fillRef>
+          <a:effectRef idx="0">
+            <a:schemeClr val="accent1"/>
+          </a:effectRef>
+          <a:fontRef idx="minor">
+            <a:schemeClr val="tx1"/>
+          </a:fontRef>
+        </p:style>
+      </p:cxnSp>
+      <p:cxnSp>
+        <p:nvCxnSpPr>
+          <p:cNvPr id="32" name="Straight Arrow Connector 31">
+            <a:extLst>
+              <a:ext uri="{FF2B5EF4-FFF2-40B4-BE49-F238E27FC236}">
+                <a16:creationId xmlns:a16="http://schemas.microsoft.com/office/drawing/2014/main" id="{FC2CDA29-3976-41AA-BA99-1F4F2A987E1F}"/>
+              </a:ext>
+            </a:extLst>
+          </p:cNvPr>
+          <p:cNvCxnSpPr>
+            <a:stCxn id="28" idx="6"/>
+            <a:endCxn id="23" idx="1"/>
+          </p:cNvCxnSpPr>
+          <p:nvPr/>
+        </p:nvCxnSpPr>
+        <p:spPr>
+          <a:xfrm>
+            <a:off x="3230046" y="3275808"/>
+            <a:ext cx="862808" cy="31125"/>
+          </a:xfrm>
+          <a:prstGeom prst="straightConnector1">
+            <a:avLst/>
+          </a:prstGeom>
+          <a:ln>
+            <a:tailEnd type="triangle"/>
+          </a:ln>
+        </p:spPr>
+        <p:style>
+          <a:lnRef idx="1">
+            <a:schemeClr val="accent1"/>
+          </a:lnRef>
+          <a:fillRef idx="0">
+            <a:schemeClr val="accent1"/>
+          </a:fillRef>
+          <a:effectRef idx="0">
+            <a:schemeClr val="accent1"/>
+          </a:effectRef>
+          <a:fontRef idx="minor">
+            <a:schemeClr val="tx1"/>
+          </a:fontRef>
+        </p:style>
+      </p:cxnSp>
+      <p:sp>
+        <p:nvSpPr>
+          <p:cNvPr id="35" name="Rectangle: Rounded Corners 34">
+            <a:extLst>
+              <a:ext uri="{FF2B5EF4-FFF2-40B4-BE49-F238E27FC236}">
+                <a16:creationId xmlns:a16="http://schemas.microsoft.com/office/drawing/2014/main" id="{15620234-8E89-4778-861C-9BDF38274024}"/>
+              </a:ext>
+            </a:extLst>
+          </p:cNvPr>
+          <p:cNvSpPr/>
+          <p:nvPr/>
+        </p:nvSpPr>
+        <p:spPr>
+          <a:xfrm>
+            <a:off x="4092854" y="4083729"/>
+            <a:ext cx="1722019" cy="452761"/>
+          </a:xfrm>
+          <a:prstGeom prst="roundRect">
+            <a:avLst/>
+          </a:prstGeom>
+          <a:solidFill>
+            <a:schemeClr val="accent6">
+              <a:lumMod val="75000"/>
+            </a:schemeClr>
+          </a:solidFill>
+          <a:ln>
+            <a:noFill/>
+          </a:ln>
+          <a:effectLst>
+            <a:outerShdw blurRad="44450" dist="27940" dir="5400000" algn="ctr">
+              <a:srgbClr val="000000">
+                <a:alpha val="32000"/>
+              </a:srgbClr>
+            </a:outerShdw>
+          </a:effectLst>
+          <a:scene3d>
+            <a:camera prst="orthographicFront">
+              <a:rot lat="0" lon="0" rev="0"/>
+            </a:camera>
+            <a:lightRig rig="balanced" dir="t">
+              <a:rot lat="0" lon="0" rev="8700000"/>
+            </a:lightRig>
+          </a:scene3d>
+          <a:sp3d>
+            <a:bevelT w="190500" h="38100"/>
+          </a:sp3d>
+        </p:spPr>
+        <p:style>
+          <a:lnRef idx="2">
+            <a:schemeClr val="accent1">
+              <a:shade val="50000"/>
+            </a:schemeClr>
+          </a:lnRef>
+          <a:fillRef idx="1">
+            <a:schemeClr val="accent1"/>
+          </a:fillRef>
+          <a:effectRef idx="0">
+            <a:schemeClr val="accent1"/>
+          </a:effectRef>
+          <a:fontRef idx="minor">
+            <a:schemeClr val="lt1"/>
+          </a:fontRef>
+        </p:style>
+        <p:txBody>
+          <a:bodyPr rtlCol="0" anchor="ctr"/>
+          <a:lstStyle/>
+          <a:p>
+            <a:pPr algn="ctr"/>
+            <a:r>
+              <a:rPr lang="en-US" dirty="0"/>
+              <a:t>PORT = 3000</a:t>
+            </a:r>
+          </a:p>
+        </p:txBody>
+      </p:sp>
+      <p:sp>
+        <p:nvSpPr>
+          <p:cNvPr id="38" name="Oval 37">
+            <a:extLst>
+              <a:ext uri="{FF2B5EF4-FFF2-40B4-BE49-F238E27FC236}">
+                <a16:creationId xmlns:a16="http://schemas.microsoft.com/office/drawing/2014/main" id="{C9931BB3-229F-4C8E-9EAD-4F2BD9757CCE}"/>
+              </a:ext>
+            </a:extLst>
+          </p:cNvPr>
+          <p:cNvSpPr/>
+          <p:nvPr/>
+        </p:nvSpPr>
+        <p:spPr>
+          <a:xfrm>
+            <a:off x="2351157" y="4085949"/>
+            <a:ext cx="1057868" cy="452761"/>
+          </a:xfrm>
+          <a:prstGeom prst="ellipse">
+            <a:avLst/>
+          </a:prstGeom>
+          <a:solidFill>
+            <a:schemeClr val="tx2">
+              <a:lumMod val="50000"/>
+            </a:schemeClr>
+          </a:solidFill>
+          <a:ln>
+            <a:noFill/>
+          </a:ln>
+          <a:effectLst>
+            <a:outerShdw blurRad="44450" dist="27940" dir="5400000" algn="ctr">
+              <a:srgbClr val="000000">
+                <a:alpha val="32000"/>
+              </a:srgbClr>
+            </a:outerShdw>
+          </a:effectLst>
+          <a:scene3d>
+            <a:camera prst="orthographicFront">
+              <a:rot lat="0" lon="0" rev="0"/>
+            </a:camera>
+            <a:lightRig rig="balanced" dir="t">
+              <a:rot lat="0" lon="0" rev="8700000"/>
+            </a:lightRig>
+          </a:scene3d>
+          <a:sp3d>
+            <a:bevelT w="190500" h="38100"/>
+          </a:sp3d>
+        </p:spPr>
+        <p:style>
+          <a:lnRef idx="2">
+            <a:schemeClr val="accent1">
+              <a:shade val="50000"/>
+            </a:schemeClr>
+          </a:lnRef>
+          <a:fillRef idx="1">
+            <a:schemeClr val="accent1"/>
+          </a:fillRef>
+          <a:effectRef idx="0">
+            <a:schemeClr val="accent1"/>
+          </a:effectRef>
+          <a:fontRef idx="minor">
+            <a:schemeClr val="lt1"/>
+          </a:fontRef>
+        </p:style>
+        <p:txBody>
+          <a:bodyPr rtlCol="0" anchor="ctr"/>
+          <a:lstStyle/>
+          <a:p>
+            <a:pPr algn="ctr"/>
+            <a:r>
+              <a:rPr lang="en-US" dirty="0"/>
+              <a:t>Listen</a:t>
+            </a:r>
+          </a:p>
+        </p:txBody>
+      </p:sp>
+      <p:cxnSp>
+        <p:nvCxnSpPr>
+          <p:cNvPr id="40" name="Straight Arrow Connector 39">
+            <a:extLst>
+              <a:ext uri="{FF2B5EF4-FFF2-40B4-BE49-F238E27FC236}">
+                <a16:creationId xmlns:a16="http://schemas.microsoft.com/office/drawing/2014/main" id="{6A0F9891-C606-4FAC-92DE-7FDC1546D89E}"/>
+              </a:ext>
+            </a:extLst>
+          </p:cNvPr>
+          <p:cNvCxnSpPr>
+            <a:stCxn id="2" idx="3"/>
+            <a:endCxn id="38" idx="2"/>
+          </p:cNvCxnSpPr>
+          <p:nvPr/>
+        </p:nvCxnSpPr>
+        <p:spPr>
+          <a:xfrm>
+            <a:off x="1527208" y="3202620"/>
+            <a:ext cx="823949" cy="1109710"/>
+          </a:xfrm>
+          <a:prstGeom prst="straightConnector1">
+            <a:avLst/>
+          </a:prstGeom>
+          <a:ln>
+            <a:tailEnd type="triangle"/>
+          </a:ln>
+        </p:spPr>
+        <p:style>
+          <a:lnRef idx="1">
+            <a:schemeClr val="accent1"/>
+          </a:lnRef>
+          <a:fillRef idx="0">
+            <a:schemeClr val="accent1"/>
+          </a:fillRef>
+          <a:effectRef idx="0">
+            <a:schemeClr val="accent1"/>
+          </a:effectRef>
+          <a:fontRef idx="minor">
+            <a:schemeClr val="tx1"/>
+          </a:fontRef>
+        </p:style>
+      </p:cxnSp>
+      <p:cxnSp>
+        <p:nvCxnSpPr>
+          <p:cNvPr id="42" name="Straight Arrow Connector 41">
+            <a:extLst>
+              <a:ext uri="{FF2B5EF4-FFF2-40B4-BE49-F238E27FC236}">
+                <a16:creationId xmlns:a16="http://schemas.microsoft.com/office/drawing/2014/main" id="{072AFF7A-7601-4307-86E4-04080DC6D8D3}"/>
+              </a:ext>
+            </a:extLst>
+          </p:cNvPr>
+          <p:cNvCxnSpPr>
+            <a:stCxn id="38" idx="6"/>
+            <a:endCxn id="35" idx="1"/>
+          </p:cNvCxnSpPr>
+          <p:nvPr/>
+        </p:nvCxnSpPr>
+        <p:spPr>
+          <a:xfrm flipV="1">
+            <a:off x="3409025" y="4310110"/>
+            <a:ext cx="683829" cy="2220"/>
+          </a:xfrm>
+          <a:prstGeom prst="straightConnector1">
+            <a:avLst/>
+          </a:prstGeom>
+          <a:ln>
+            <a:tailEnd type="triangle"/>
+          </a:ln>
+        </p:spPr>
+        <p:style>
+          <a:lnRef idx="1">
+            <a:schemeClr val="accent1"/>
+          </a:lnRef>
+          <a:fillRef idx="0">
+            <a:schemeClr val="accent1"/>
+          </a:fillRef>
+          <a:effectRef idx="0">
+            <a:schemeClr val="accent1"/>
+          </a:effectRef>
+          <a:fontRef idx="minor">
+            <a:schemeClr val="tx1"/>
+          </a:fontRef>
+        </p:style>
+      </p:cxnSp>
+    </p:spTree>
+    <p:extLst>
+      <p:ext uri="{BB962C8B-B14F-4D97-AF65-F5344CB8AC3E}">
+        <p14:creationId xmlns:p14="http://schemas.microsoft.com/office/powerpoint/2010/main" val="1138778218"/>
+      </p:ext>
+    </p:extLst>
+  </p:cSld>
+  <p:clrMapOvr>
+    <a:masterClrMapping/>
+  </p:clrMapOvr>
+</p:sld>
+</file>
+
+<file path=ppt/slides/slide3.xml><?xml version="1.0" encoding="utf-8"?>
+<p:sld xmlns:a="http://schemas.openxmlformats.org/drawingml/2006/main" xmlns:r="http://schemas.openxmlformats.org/officeDocument/2006/relationships" xmlns:p="http://schemas.openxmlformats.org/presentationml/2006/main">
+  <p:cSld>
+    <p:spTree>
+      <p:nvGrpSpPr>
+        <p:cNvPr id="1" name=""/>
+        <p:cNvGrpSpPr/>
+        <p:nvPr/>
+      </p:nvGrpSpPr>
+      <p:grpSpPr>
+        <a:xfrm>
+          <a:off x="0" y="0"/>
+          <a:ext cx="0" cy="0"/>
+          <a:chOff x="0" y="0"/>
+          <a:chExt cx="0" cy="0"/>
+        </a:xfrm>
+      </p:grpSpPr>
+      <p:sp>
+        <p:nvSpPr>
+          <p:cNvPr id="4" name="Rectangle 3">
+            <a:extLst>
+              <a:ext uri="{FF2B5EF4-FFF2-40B4-BE49-F238E27FC236}">
+                <a16:creationId xmlns:a16="http://schemas.microsoft.com/office/drawing/2014/main" id="{ACFF2CAA-0DBF-40CA-91B3-0B1EABFFB2BF}"/>
+              </a:ext>
+            </a:extLst>
+          </p:cNvPr>
+          <p:cNvSpPr/>
+          <p:nvPr/>
+        </p:nvSpPr>
+        <p:spPr>
+          <a:xfrm>
+            <a:off x="0" y="0"/>
             <a:ext cx="1858202" cy="923330"/>
           </a:xfrm>
           <a:prstGeom prst="rect">
@@ -3869,7 +5065,7 @@
 </p:sld>
 </file>
 
-<file path=ppt/slides/slide3.xml><?xml version="1.0" encoding="utf-8"?>
+<file path=ppt/slides/slide4.xml><?xml version="1.0" encoding="utf-8"?>
 <p:sld xmlns:a="http://schemas.openxmlformats.org/drawingml/2006/main" xmlns:r="http://schemas.openxmlformats.org/officeDocument/2006/relationships" xmlns:p="http://schemas.openxmlformats.org/presentationml/2006/main">
   <p:cSld>
     <p:spTree>

</xml_diff>